<commit_message>
removed non-adjacent from wording
</commit_message>
<xml_diff>
--- a/spring13/slides13/microquiz-apr5.pptx
+++ b/spring13/slides13/microquiz-apr5.pptx
@@ -3252,7 +3252,21 @@
                 <a:latin typeface="Comic Sans MS"/>
                 <a:cs typeface="Comic Sans MS"/>
               </a:rPr>
-              <a:t>Name two nonadjacent vertices that are </a:t>
+              <a:t>Name two </a:t>
+            </a:r>
+            <a:r>
+              <a:rPr lang="en-US" sz="3200" dirty="0" smtClean="0">
+                <a:latin typeface="Comic Sans MS"/>
+                <a:cs typeface="Comic Sans MS"/>
+              </a:rPr>
+              <a:t>vertices </a:t>
+            </a:r>
+            <a:r>
+              <a:rPr lang="en-US" sz="3200" dirty="0">
+                <a:latin typeface="Comic Sans MS"/>
+                <a:cs typeface="Comic Sans MS"/>
+              </a:rPr>
+              <a:t>that are </a:t>
             </a:r>
             <a:r>
               <a:rPr lang="en-US" sz="3200" dirty="0" smtClean="0">
@@ -3282,14 +3296,14 @@
                 <a:latin typeface="Comic Sans MS"/>
                 <a:cs typeface="Comic Sans MS"/>
               </a:rPr>
-              <a:t>-edge connected</a:t>
+              <a:t>-edge </a:t>
             </a:r>
             <a:r>
               <a:rPr lang="en-US" sz="3200" dirty="0" smtClean="0">
                 <a:latin typeface="Comic Sans MS"/>
                 <a:cs typeface="Comic Sans MS"/>
               </a:rPr>
-              <a:t> </a:t>
+              <a:t>connected</a:t>
             </a:r>
             <a:endParaRPr lang="en-US" sz="3200" dirty="0">
               <a:latin typeface="Comic Sans MS"/>

</xml_diff>